<commit_message>
Addition of Lecture 11 and 12
</commit_message>
<xml_diff>
--- a/Lecture 10/lecture10.pptx
+++ b/Lecture 10/lecture10.pptx
@@ -178,7 +178,7 @@
   </p:defaultTextStyle>
   <p:extLst>
     <p:ext uri="{EFAFB233-063F-42B5-8137-9DF3F51BA10A}">
-      <p15:sldGuideLst xmlns:p15="http://schemas.microsoft.com/office/powerpoint/2012/main" xmlns="">
+      <p15:sldGuideLst xmlns="" xmlns:p15="http://schemas.microsoft.com/office/powerpoint/2012/main">
         <p15:guide id="1" orient="horz" pos="2160" userDrawn="1">
           <p15:clr>
             <a:srgbClr val="A4A3A4"/>
@@ -192,7 +192,7 @@
       </p15:sldGuideLst>
     </p:ext>
     <p:ext uri="{2D200454-40CA-4A62-9FC3-DE9A4176ACB9}">
-      <p15:notesGuideLst xmlns:p15="http://schemas.microsoft.com/office/powerpoint/2012/main" xmlns="">
+      <p15:notesGuideLst xmlns="" xmlns:p15="http://schemas.microsoft.com/office/powerpoint/2012/main">
         <p15:guide id="1" orient="horz" pos="2880">
           <p15:clr>
             <a:srgbClr val="A4A3A4"/>
@@ -292,7 +292,7 @@
             <a:fld id="{B4B40DF5-17F0-43C5-A7AE-65A758E8AB63}" type="datetimeFigureOut">
               <a:rPr lang="nl-NL" smtClean="0"/>
               <a:pPr/>
-              <a:t>4/21/21</a:t>
+              <a:t>4/27/21</a:t>
             </a:fld>
             <a:endParaRPr lang="nl-NL"/>
           </a:p>
@@ -458,7 +458,7 @@
           <a:p>
             <a:fld id="{A93D6BD4-2A44-460F-8349-CDAFC499EC45}" type="datetimeFigureOut">
               <a:rPr lang="en-US" smtClean="0"/>
-              <a:t>4/21/21</a:t>
+              <a:t>4/27/21</a:t>
             </a:fld>
             <a:endParaRPr lang="en-US"/>
           </a:p>
@@ -5562,7 +5562,39 @@
                   <a:schemeClr val="tx2"/>
                 </a:solidFill>
               </a:rPr>
-              <a:t>Searches a string for a specified value, or regular expression, and returns the position of the match.</a:t>
+              <a:t>Searches a string for a specified value, or regular expression, and returns the position of </a:t>
+            </a:r>
+            <a:r>
+              <a:rPr lang="en-US" sz="1600" dirty="0" smtClean="0">
+                <a:solidFill>
+                  <a:schemeClr val="tx2"/>
+                </a:solidFill>
+              </a:rPr>
+              <a:t>the </a:t>
+            </a:r>
+            <a:r>
+              <a:rPr lang="en-US" sz="1600" dirty="0" smtClean="0">
+                <a:solidFill>
+                  <a:srgbClr val="FFFF00"/>
+                </a:solidFill>
+              </a:rPr>
+              <a:t>first</a:t>
+            </a:r>
+            <a:r>
+              <a:rPr lang="en-US" sz="1600" dirty="0" smtClean="0">
+                <a:solidFill>
+                  <a:schemeClr val="tx2"/>
+                </a:solidFill>
+              </a:rPr>
+              <a:t> </a:t>
+            </a:r>
+            <a:r>
+              <a:rPr lang="en-US" sz="1600" dirty="0">
+                <a:solidFill>
+                  <a:schemeClr val="tx2"/>
+                </a:solidFill>
+              </a:rPr>
+              <a:t>match.</a:t>
             </a:r>
           </a:p>
           <a:p>
@@ -5743,8 +5775,35 @@
                 <a:latin typeface="Courier New" panose="02070309020205020404" pitchFamily="49" charset="0"/>
                 <a:cs typeface="Courier New" panose="02070309020205020404" pitchFamily="49" charset="0"/>
               </a:rPr>
-              <a:t>);</a:t>
-            </a:r>
+              <a:t>)</a:t>
+            </a:r>
+            <a:r>
+              <a:rPr lang="en-US" sz="1600" dirty="0" smtClean="0">
+                <a:solidFill>
+                  <a:schemeClr val="tx2"/>
+                </a:solidFill>
+                <a:latin typeface="Courier New" panose="02070309020205020404" pitchFamily="49" charset="0"/>
+                <a:cs typeface="Courier New" panose="02070309020205020404" pitchFamily="49" charset="0"/>
+              </a:rPr>
+              <a:t>;				</a:t>
+            </a:r>
+            <a:r>
+              <a:rPr lang="en-US" sz="1600" dirty="0" smtClean="0">
+                <a:solidFill>
+                  <a:srgbClr val="FFFF00"/>
+                </a:solidFill>
+                <a:latin typeface="Courier New" panose="02070309020205020404" pitchFamily="49" charset="0"/>
+                <a:cs typeface="Courier New" panose="02070309020205020404" pitchFamily="49" charset="0"/>
+              </a:rPr>
+              <a:t>The /g here doesn’t make sense because .search() only returns first match</a:t>
+            </a:r>
+            <a:endParaRPr lang="en-US" sz="1600" dirty="0">
+              <a:solidFill>
+                <a:srgbClr val="FFFF00"/>
+              </a:solidFill>
+              <a:latin typeface="Courier New" panose="02070309020205020404" pitchFamily="49" charset="0"/>
+              <a:cs typeface="Courier New" panose="02070309020205020404" pitchFamily="49" charset="0"/>
+            </a:endParaRPr>
           </a:p>
           <a:p>
             <a:pPr>
@@ -5960,11 +6019,86 @@
                 </a:solidFill>
                 <a:hlinkClick r:id="rId2"/>
               </a:rPr>
-              <a:t>http://www.tothenew.com/blog/javascript-slice-vs-substring-vs-substr/</a:t>
+              <a:t>http://www.tothenew.com/blog/javascript-slice-vs-substring-vs-substr</a:t>
+            </a:r>
+            <a:r>
+              <a:rPr lang="en-US" sz="1600" dirty="0" smtClean="0">
+                <a:solidFill>
+                  <a:schemeClr val="tx2"/>
+                </a:solidFill>
+                <a:hlinkClick r:id="rId2"/>
+              </a:rPr>
+              <a:t>/</a:t>
+            </a:r>
+            <a:endParaRPr lang="en-US" sz="1600" dirty="0" smtClean="0">
+              <a:solidFill>
+                <a:schemeClr val="tx2"/>
+              </a:solidFill>
+            </a:endParaRPr>
+          </a:p>
+          <a:p>
+            <a:pPr>
+              <a:defRPr/>
+            </a:pPr>
+            <a:r>
+              <a:rPr lang="en-US" sz="1600" dirty="0" smtClean="0">
+                <a:solidFill>
+                  <a:srgbClr val="FFFF00"/>
+                </a:solidFill>
+              </a:rPr>
+              <a:t>After reading the article, my takeaway is that slice() and substring() take </a:t>
+            </a:r>
+            <a:r>
+              <a:rPr lang="en-US" sz="1600" dirty="0" err="1" smtClean="0">
+                <a:solidFill>
+                  <a:srgbClr val="FFFF00"/>
+                </a:solidFill>
+              </a:rPr>
+              <a:t>start_position</a:t>
+            </a:r>
+            <a:r>
+              <a:rPr lang="en-US" sz="1600" dirty="0" smtClean="0">
+                <a:solidFill>
+                  <a:srgbClr val="FFFF00"/>
+                </a:solidFill>
+              </a:rPr>
+              <a:t> and an optional </a:t>
+            </a:r>
+            <a:r>
+              <a:rPr lang="en-US" sz="1600" dirty="0" err="1" smtClean="0">
+                <a:solidFill>
+                  <a:srgbClr val="FFFF00"/>
+                </a:solidFill>
+              </a:rPr>
+              <a:t>end_position</a:t>
+            </a:r>
+            <a:r>
+              <a:rPr lang="en-US" sz="1600" dirty="0" smtClean="0">
+                <a:solidFill>
+                  <a:srgbClr val="FFFF00"/>
+                </a:solidFill>
+              </a:rPr>
+              <a:t> (exclusive). However, </a:t>
+            </a:r>
+            <a:r>
+              <a:rPr lang="en-US" sz="1600" dirty="0" err="1" smtClean="0">
+                <a:solidFill>
+                  <a:srgbClr val="FFFF00"/>
+                </a:solidFill>
+              </a:rPr>
+              <a:t>substr</a:t>
+            </a:r>
+            <a:r>
+              <a:rPr lang="en-US" sz="1600" dirty="0" smtClean="0">
+                <a:solidFill>
+                  <a:srgbClr val="FFFF00"/>
+                </a:solidFill>
+              </a:rPr>
+              <a:t>()’s second parameter is (number of characters to select), not the position of the end character.</a:t>
             </a:r>
             <a:endParaRPr lang="en-US" sz="1600" dirty="0">
               <a:solidFill>
-                <a:schemeClr val="tx2"/>
+                <a:srgbClr val="FFFF00"/>
               </a:solidFill>
             </a:endParaRPr>
           </a:p>
@@ -7941,14 +8075,14 @@
                 <a:gridCol w="1895920">
                   <a:extLst>
                     <a:ext uri="{9D8B030D-6E8A-4147-A177-3AD203B41FA5}">
-                      <a16:colId xmlns:a16="http://schemas.microsoft.com/office/drawing/2014/main" xmlns="" val="20000"/>
+                      <a16:colId xmlns="" xmlns:a16="http://schemas.microsoft.com/office/drawing/2014/main" val="20000"/>
                     </a:ext>
                   </a:extLst>
                 </a:gridCol>
                 <a:gridCol w="10296080">
                   <a:extLst>
                     <a:ext uri="{9D8B030D-6E8A-4147-A177-3AD203B41FA5}">
-                      <a16:colId xmlns:a16="http://schemas.microsoft.com/office/drawing/2014/main" xmlns="" val="20001"/>
+                      <a16:colId xmlns="" xmlns:a16="http://schemas.microsoft.com/office/drawing/2014/main" val="20001"/>
                     </a:ext>
                   </a:extLst>
                 </a:gridCol>
@@ -8024,7 +8158,7 @@
                 </a:tc>
                 <a:extLst>
                   <a:ext uri="{0D108BD9-81ED-4DB2-BD59-A6C34878D82A}">
-                    <a16:rowId xmlns:a16="http://schemas.microsoft.com/office/drawing/2014/main" xmlns="" val="10000"/>
+                    <a16:rowId xmlns="" xmlns:a16="http://schemas.microsoft.com/office/drawing/2014/main" val="10000"/>
                   </a:ext>
                 </a:extLst>
               </a:tr>
@@ -8132,7 +8266,7 @@
                 </a:tc>
                 <a:extLst>
                   <a:ext uri="{0D108BD9-81ED-4DB2-BD59-A6C34878D82A}">
-                    <a16:rowId xmlns:a16="http://schemas.microsoft.com/office/drawing/2014/main" xmlns="" val="10001"/>
+                    <a16:rowId xmlns="" xmlns:a16="http://schemas.microsoft.com/office/drawing/2014/main" val="10001"/>
                   </a:ext>
                 </a:extLst>
               </a:tr>
@@ -8250,7 +8384,7 @@
                 </a:tc>
                 <a:extLst>
                   <a:ext uri="{0D108BD9-81ED-4DB2-BD59-A6C34878D82A}">
-                    <a16:rowId xmlns:a16="http://schemas.microsoft.com/office/drawing/2014/main" xmlns="" val="10002"/>
+                    <a16:rowId xmlns="" xmlns:a16="http://schemas.microsoft.com/office/drawing/2014/main" val="10002"/>
                   </a:ext>
                 </a:extLst>
               </a:tr>
@@ -8368,7 +8502,7 @@
                 </a:tc>
                 <a:extLst>
                   <a:ext uri="{0D108BD9-81ED-4DB2-BD59-A6C34878D82A}">
-                    <a16:rowId xmlns:a16="http://schemas.microsoft.com/office/drawing/2014/main" xmlns="" val="10003"/>
+                    <a16:rowId xmlns="" xmlns:a16="http://schemas.microsoft.com/office/drawing/2014/main" val="10003"/>
                   </a:ext>
                 </a:extLst>
               </a:tr>
@@ -8517,14 +8651,14 @@
                 <a:gridCol w="1895920">
                   <a:extLst>
                     <a:ext uri="{9D8B030D-6E8A-4147-A177-3AD203B41FA5}">
-                      <a16:colId xmlns:a16="http://schemas.microsoft.com/office/drawing/2014/main" xmlns="" val="20000"/>
+                      <a16:colId xmlns="" xmlns:a16="http://schemas.microsoft.com/office/drawing/2014/main" val="20000"/>
                     </a:ext>
                   </a:extLst>
                 </a:gridCol>
                 <a:gridCol w="10296080">
                   <a:extLst>
                     <a:ext uri="{9D8B030D-6E8A-4147-A177-3AD203B41FA5}">
-                      <a16:colId xmlns:a16="http://schemas.microsoft.com/office/drawing/2014/main" xmlns="" val="20001"/>
+                      <a16:colId xmlns="" xmlns:a16="http://schemas.microsoft.com/office/drawing/2014/main" val="20001"/>
                     </a:ext>
                   </a:extLst>
                 </a:gridCol>
@@ -8608,7 +8742,7 @@
                 </a:tc>
                 <a:extLst>
                   <a:ext uri="{0D108BD9-81ED-4DB2-BD59-A6C34878D82A}">
-                    <a16:rowId xmlns:a16="http://schemas.microsoft.com/office/drawing/2014/main" xmlns="" val="10000"/>
+                    <a16:rowId xmlns="" xmlns:a16="http://schemas.microsoft.com/office/drawing/2014/main" val="10000"/>
                   </a:ext>
                 </a:extLst>
               </a:tr>
@@ -8697,7 +8831,7 @@
                 </a:tc>
                 <a:extLst>
                   <a:ext uri="{0D108BD9-81ED-4DB2-BD59-A6C34878D82A}">
-                    <a16:rowId xmlns:a16="http://schemas.microsoft.com/office/drawing/2014/main" xmlns="" val="10001"/>
+                    <a16:rowId xmlns="" xmlns:a16="http://schemas.microsoft.com/office/drawing/2014/main" val="10001"/>
                   </a:ext>
                 </a:extLst>
               </a:tr>
@@ -8794,7 +8928,7 @@
                 </a:tc>
                 <a:extLst>
                   <a:ext uri="{0D108BD9-81ED-4DB2-BD59-A6C34878D82A}">
-                    <a16:rowId xmlns:a16="http://schemas.microsoft.com/office/drawing/2014/main" xmlns="" val="10002"/>
+                    <a16:rowId xmlns="" xmlns:a16="http://schemas.microsoft.com/office/drawing/2014/main" val="10002"/>
                   </a:ext>
                 </a:extLst>
               </a:tr>
@@ -8883,7 +9017,7 @@
                 </a:tc>
                 <a:extLst>
                   <a:ext uri="{0D108BD9-81ED-4DB2-BD59-A6C34878D82A}">
-                    <a16:rowId xmlns:a16="http://schemas.microsoft.com/office/drawing/2014/main" xmlns="" val="10003"/>
+                    <a16:rowId xmlns="" xmlns:a16="http://schemas.microsoft.com/office/drawing/2014/main" val="10003"/>
                   </a:ext>
                 </a:extLst>
               </a:tr>
@@ -8972,7 +9106,7 @@
                 </a:tc>
                 <a:extLst>
                   <a:ext uri="{0D108BD9-81ED-4DB2-BD59-A6C34878D82A}">
-                    <a16:rowId xmlns:a16="http://schemas.microsoft.com/office/drawing/2014/main" xmlns="" val="10004"/>
+                    <a16:rowId xmlns="" xmlns:a16="http://schemas.microsoft.com/office/drawing/2014/main" val="10004"/>
                   </a:ext>
                 </a:extLst>
               </a:tr>
@@ -9061,7 +9195,7 @@
                 </a:tc>
                 <a:extLst>
                   <a:ext uri="{0D108BD9-81ED-4DB2-BD59-A6C34878D82A}">
-                    <a16:rowId xmlns:a16="http://schemas.microsoft.com/office/drawing/2014/main" xmlns="" val="10005"/>
+                    <a16:rowId xmlns="" xmlns:a16="http://schemas.microsoft.com/office/drawing/2014/main" val="10005"/>
                   </a:ext>
                 </a:extLst>
               </a:tr>
@@ -9442,14 +9576,14 @@
                 <a:gridCol w="1895920">
                   <a:extLst>
                     <a:ext uri="{9D8B030D-6E8A-4147-A177-3AD203B41FA5}">
-                      <a16:colId xmlns:a16="http://schemas.microsoft.com/office/drawing/2014/main" xmlns="" val="20000"/>
+                      <a16:colId xmlns="" xmlns:a16="http://schemas.microsoft.com/office/drawing/2014/main" val="20000"/>
                     </a:ext>
                   </a:extLst>
                 </a:gridCol>
                 <a:gridCol w="10296080">
                   <a:extLst>
                     <a:ext uri="{9D8B030D-6E8A-4147-A177-3AD203B41FA5}">
-                      <a16:colId xmlns:a16="http://schemas.microsoft.com/office/drawing/2014/main" xmlns="" val="20001"/>
+                      <a16:colId xmlns="" xmlns:a16="http://schemas.microsoft.com/office/drawing/2014/main" val="20001"/>
                     </a:ext>
                   </a:extLst>
                 </a:gridCol>
@@ -9525,7 +9659,7 @@
                 </a:tc>
                 <a:extLst>
                   <a:ext uri="{0D108BD9-81ED-4DB2-BD59-A6C34878D82A}">
-                    <a16:rowId xmlns:a16="http://schemas.microsoft.com/office/drawing/2014/main" xmlns="" val="10000"/>
+                    <a16:rowId xmlns="" xmlns:a16="http://schemas.microsoft.com/office/drawing/2014/main" val="10000"/>
                   </a:ext>
                 </a:extLst>
               </a:tr>
@@ -9616,7 +9750,7 @@
                 </a:tc>
                 <a:extLst>
                   <a:ext uri="{0D108BD9-81ED-4DB2-BD59-A6C34878D82A}">
-                    <a16:rowId xmlns:a16="http://schemas.microsoft.com/office/drawing/2014/main" xmlns="" val="10001"/>
+                    <a16:rowId xmlns="" xmlns:a16="http://schemas.microsoft.com/office/drawing/2014/main" val="10001"/>
                   </a:ext>
                 </a:extLst>
               </a:tr>
@@ -9707,7 +9841,7 @@
                 </a:tc>
                 <a:extLst>
                   <a:ext uri="{0D108BD9-81ED-4DB2-BD59-A6C34878D82A}">
-                    <a16:rowId xmlns:a16="http://schemas.microsoft.com/office/drawing/2014/main" xmlns="" val="10002"/>
+                    <a16:rowId xmlns="" xmlns:a16="http://schemas.microsoft.com/office/drawing/2014/main" val="10002"/>
                   </a:ext>
                 </a:extLst>
               </a:tr>
@@ -9798,7 +9932,7 @@
                 </a:tc>
                 <a:extLst>
                   <a:ext uri="{0D108BD9-81ED-4DB2-BD59-A6C34878D82A}">
-                    <a16:rowId xmlns:a16="http://schemas.microsoft.com/office/drawing/2014/main" xmlns="" val="10003"/>
+                    <a16:rowId xmlns="" xmlns:a16="http://schemas.microsoft.com/office/drawing/2014/main" val="10003"/>
                   </a:ext>
                 </a:extLst>
               </a:tr>
@@ -9889,7 +10023,7 @@
                 </a:tc>
                 <a:extLst>
                   <a:ext uri="{0D108BD9-81ED-4DB2-BD59-A6C34878D82A}">
-                    <a16:rowId xmlns:a16="http://schemas.microsoft.com/office/drawing/2014/main" xmlns="" val="10004"/>
+                    <a16:rowId xmlns="" xmlns:a16="http://schemas.microsoft.com/office/drawing/2014/main" val="10004"/>
                   </a:ext>
                 </a:extLst>
               </a:tr>
@@ -9980,7 +10114,7 @@
                 </a:tc>
                 <a:extLst>
                   <a:ext uri="{0D108BD9-81ED-4DB2-BD59-A6C34878D82A}">
-                    <a16:rowId xmlns:a16="http://schemas.microsoft.com/office/drawing/2014/main" xmlns="" val="10005"/>
+                    <a16:rowId xmlns="" xmlns:a16="http://schemas.microsoft.com/office/drawing/2014/main" val="10005"/>
                   </a:ext>
                 </a:extLst>
               </a:tr>
@@ -10071,7 +10205,7 @@
                 </a:tc>
                 <a:extLst>
                   <a:ext uri="{0D108BD9-81ED-4DB2-BD59-A6C34878D82A}">
-                    <a16:rowId xmlns:a16="http://schemas.microsoft.com/office/drawing/2014/main" xmlns="" val="10006"/>
+                    <a16:rowId xmlns="" xmlns:a16="http://schemas.microsoft.com/office/drawing/2014/main" val="10006"/>
                   </a:ext>
                 </a:extLst>
               </a:tr>
@@ -10162,7 +10296,7 @@
                 </a:tc>
                 <a:extLst>
                   <a:ext uri="{0D108BD9-81ED-4DB2-BD59-A6C34878D82A}">
-                    <a16:rowId xmlns:a16="http://schemas.microsoft.com/office/drawing/2014/main" xmlns="" val="10007"/>
+                    <a16:rowId xmlns="" xmlns:a16="http://schemas.microsoft.com/office/drawing/2014/main" val="10007"/>
                   </a:ext>
                 </a:extLst>
               </a:tr>
@@ -10253,7 +10387,7 @@
                 </a:tc>
                 <a:extLst>
                   <a:ext uri="{0D108BD9-81ED-4DB2-BD59-A6C34878D82A}">
-                    <a16:rowId xmlns:a16="http://schemas.microsoft.com/office/drawing/2014/main" xmlns="" val="10008"/>
+                    <a16:rowId xmlns="" xmlns:a16="http://schemas.microsoft.com/office/drawing/2014/main" val="10008"/>
                   </a:ext>
                 </a:extLst>
               </a:tr>
@@ -10344,7 +10478,7 @@
                 </a:tc>
                 <a:extLst>
                   <a:ext uri="{0D108BD9-81ED-4DB2-BD59-A6C34878D82A}">
-                    <a16:rowId xmlns:a16="http://schemas.microsoft.com/office/drawing/2014/main" xmlns="" val="10009"/>
+                    <a16:rowId xmlns="" xmlns:a16="http://schemas.microsoft.com/office/drawing/2014/main" val="10009"/>
                   </a:ext>
                 </a:extLst>
               </a:tr>
@@ -10556,14 +10690,14 @@
                 <a:gridCol w="1895920">
                   <a:extLst>
                     <a:ext uri="{9D8B030D-6E8A-4147-A177-3AD203B41FA5}">
-                      <a16:colId xmlns:a16="http://schemas.microsoft.com/office/drawing/2014/main" xmlns="" val="20000"/>
+                      <a16:colId xmlns="" xmlns:a16="http://schemas.microsoft.com/office/drawing/2014/main" val="20000"/>
                     </a:ext>
                   </a:extLst>
                 </a:gridCol>
                 <a:gridCol w="10296080">
                   <a:extLst>
                     <a:ext uri="{9D8B030D-6E8A-4147-A177-3AD203B41FA5}">
-                      <a16:colId xmlns:a16="http://schemas.microsoft.com/office/drawing/2014/main" xmlns="" val="20001"/>
+                      <a16:colId xmlns="" xmlns:a16="http://schemas.microsoft.com/office/drawing/2014/main" val="20001"/>
                     </a:ext>
                   </a:extLst>
                 </a:gridCol>
@@ -10639,7 +10773,7 @@
                 </a:tc>
                 <a:extLst>
                   <a:ext uri="{0D108BD9-81ED-4DB2-BD59-A6C34878D82A}">
-                    <a16:rowId xmlns:a16="http://schemas.microsoft.com/office/drawing/2014/main" xmlns="" val="10000"/>
+                    <a16:rowId xmlns="" xmlns:a16="http://schemas.microsoft.com/office/drawing/2014/main" val="10000"/>
                   </a:ext>
                 </a:extLst>
               </a:tr>
@@ -10728,7 +10862,7 @@
                 </a:tc>
                 <a:extLst>
                   <a:ext uri="{0D108BD9-81ED-4DB2-BD59-A6C34878D82A}">
-                    <a16:rowId xmlns:a16="http://schemas.microsoft.com/office/drawing/2014/main" xmlns="" val="10001"/>
+                    <a16:rowId xmlns="" xmlns:a16="http://schemas.microsoft.com/office/drawing/2014/main" val="10001"/>
                   </a:ext>
                 </a:extLst>
               </a:tr>
@@ -10817,7 +10951,7 @@
                 </a:tc>
                 <a:extLst>
                   <a:ext uri="{0D108BD9-81ED-4DB2-BD59-A6C34878D82A}">
-                    <a16:rowId xmlns:a16="http://schemas.microsoft.com/office/drawing/2014/main" xmlns="" val="10002"/>
+                    <a16:rowId xmlns="" xmlns:a16="http://schemas.microsoft.com/office/drawing/2014/main" val="10002"/>
                   </a:ext>
                 </a:extLst>
               </a:tr>
@@ -10906,7 +11040,7 @@
                 </a:tc>
                 <a:extLst>
                   <a:ext uri="{0D108BD9-81ED-4DB2-BD59-A6C34878D82A}">
-                    <a16:rowId xmlns:a16="http://schemas.microsoft.com/office/drawing/2014/main" xmlns="" val="10003"/>
+                    <a16:rowId xmlns="" xmlns:a16="http://schemas.microsoft.com/office/drawing/2014/main" val="10003"/>
                   </a:ext>
                 </a:extLst>
               </a:tr>
@@ -10995,7 +11129,7 @@
                 </a:tc>
                 <a:extLst>
                   <a:ext uri="{0D108BD9-81ED-4DB2-BD59-A6C34878D82A}">
-                    <a16:rowId xmlns:a16="http://schemas.microsoft.com/office/drawing/2014/main" xmlns="" val="10004"/>
+                    <a16:rowId xmlns="" xmlns:a16="http://schemas.microsoft.com/office/drawing/2014/main" val="10004"/>
                   </a:ext>
                 </a:extLst>
               </a:tr>
@@ -11084,7 +11218,7 @@
                 </a:tc>
                 <a:extLst>
                   <a:ext uri="{0D108BD9-81ED-4DB2-BD59-A6C34878D82A}">
-                    <a16:rowId xmlns:a16="http://schemas.microsoft.com/office/drawing/2014/main" xmlns="" val="10005"/>
+                    <a16:rowId xmlns="" xmlns:a16="http://schemas.microsoft.com/office/drawing/2014/main" val="10005"/>
                   </a:ext>
                 </a:extLst>
               </a:tr>
@@ -11173,7 +11307,7 @@
                 </a:tc>
                 <a:extLst>
                   <a:ext uri="{0D108BD9-81ED-4DB2-BD59-A6C34878D82A}">
-                    <a16:rowId xmlns:a16="http://schemas.microsoft.com/office/drawing/2014/main" xmlns="" val="10006"/>
+                    <a16:rowId xmlns="" xmlns:a16="http://schemas.microsoft.com/office/drawing/2014/main" val="10006"/>
                   </a:ext>
                 </a:extLst>
               </a:tr>
@@ -11262,7 +11396,7 @@
                 </a:tc>
                 <a:extLst>
                   <a:ext uri="{0D108BD9-81ED-4DB2-BD59-A6C34878D82A}">
-                    <a16:rowId xmlns:a16="http://schemas.microsoft.com/office/drawing/2014/main" xmlns="" val="10007"/>
+                    <a16:rowId xmlns="" xmlns:a16="http://schemas.microsoft.com/office/drawing/2014/main" val="10007"/>
                   </a:ext>
                 </a:extLst>
               </a:tr>
@@ -11385,7 +11519,7 @@
                 </a:tc>
                 <a:extLst>
                   <a:ext uri="{0D108BD9-81ED-4DB2-BD59-A6C34878D82A}">
-                    <a16:rowId xmlns:a16="http://schemas.microsoft.com/office/drawing/2014/main" xmlns="" val="10008"/>
+                    <a16:rowId xmlns="" xmlns:a16="http://schemas.microsoft.com/office/drawing/2014/main" val="10008"/>
                   </a:ext>
                 </a:extLst>
               </a:tr>
@@ -11508,7 +11642,7 @@
                 </a:tc>
                 <a:extLst>
                   <a:ext uri="{0D108BD9-81ED-4DB2-BD59-A6C34878D82A}">
-                    <a16:rowId xmlns:a16="http://schemas.microsoft.com/office/drawing/2014/main" xmlns="" val="10009"/>
+                    <a16:rowId xmlns="" xmlns:a16="http://schemas.microsoft.com/office/drawing/2014/main" val="10009"/>
                   </a:ext>
                 </a:extLst>
               </a:tr>
@@ -12082,14 +12216,14 @@
                 <a:gridCol w="1895920">
                   <a:extLst>
                     <a:ext uri="{9D8B030D-6E8A-4147-A177-3AD203B41FA5}">
-                      <a16:colId xmlns:a16="http://schemas.microsoft.com/office/drawing/2014/main" xmlns="" val="20000"/>
+                      <a16:colId xmlns="" xmlns:a16="http://schemas.microsoft.com/office/drawing/2014/main" val="20000"/>
                     </a:ext>
                   </a:extLst>
                 </a:gridCol>
                 <a:gridCol w="10296080">
                   <a:extLst>
                     <a:ext uri="{9D8B030D-6E8A-4147-A177-3AD203B41FA5}">
-                      <a16:colId xmlns:a16="http://schemas.microsoft.com/office/drawing/2014/main" xmlns="" val="20001"/>
+                      <a16:colId xmlns="" xmlns:a16="http://schemas.microsoft.com/office/drawing/2014/main" val="20001"/>
                     </a:ext>
                   </a:extLst>
                 </a:gridCol>
@@ -12165,7 +12299,7 @@
                 </a:tc>
                 <a:extLst>
                   <a:ext uri="{0D108BD9-81ED-4DB2-BD59-A6C34878D82A}">
-                    <a16:rowId xmlns:a16="http://schemas.microsoft.com/office/drawing/2014/main" xmlns="" val="10000"/>
+                    <a16:rowId xmlns="" xmlns:a16="http://schemas.microsoft.com/office/drawing/2014/main" val="10000"/>
                   </a:ext>
                 </a:extLst>
               </a:tr>
@@ -12265,7 +12399,7 @@
                 </a:tc>
                 <a:extLst>
                   <a:ext uri="{0D108BD9-81ED-4DB2-BD59-A6C34878D82A}">
-                    <a16:rowId xmlns:a16="http://schemas.microsoft.com/office/drawing/2014/main" xmlns="" val="10001"/>
+                    <a16:rowId xmlns="" xmlns:a16="http://schemas.microsoft.com/office/drawing/2014/main" val="10001"/>
                   </a:ext>
                 </a:extLst>
               </a:tr>
@@ -12365,7 +12499,7 @@
                 </a:tc>
                 <a:extLst>
                   <a:ext uri="{0D108BD9-81ED-4DB2-BD59-A6C34878D82A}">
-                    <a16:rowId xmlns:a16="http://schemas.microsoft.com/office/drawing/2014/main" xmlns="" val="10002"/>
+                    <a16:rowId xmlns="" xmlns:a16="http://schemas.microsoft.com/office/drawing/2014/main" val="10002"/>
                   </a:ext>
                 </a:extLst>
               </a:tr>
@@ -12465,7 +12599,7 @@
                 </a:tc>
                 <a:extLst>
                   <a:ext uri="{0D108BD9-81ED-4DB2-BD59-A6C34878D82A}">
-                    <a16:rowId xmlns:a16="http://schemas.microsoft.com/office/drawing/2014/main" xmlns="" val="10003"/>
+                    <a16:rowId xmlns="" xmlns:a16="http://schemas.microsoft.com/office/drawing/2014/main" val="10003"/>
                   </a:ext>
                 </a:extLst>
               </a:tr>
@@ -12580,7 +12714,7 @@
                 </a:tc>
                 <a:extLst>
                   <a:ext uri="{0D108BD9-81ED-4DB2-BD59-A6C34878D82A}">
-                    <a16:rowId xmlns:a16="http://schemas.microsoft.com/office/drawing/2014/main" xmlns="" val="10004"/>
+                    <a16:rowId xmlns="" xmlns:a16="http://schemas.microsoft.com/office/drawing/2014/main" val="10004"/>
                   </a:ext>
                 </a:extLst>
               </a:tr>
@@ -12683,7 +12817,7 @@
                 </a:tc>
                 <a:extLst>
                   <a:ext uri="{0D108BD9-81ED-4DB2-BD59-A6C34878D82A}">
-                    <a16:rowId xmlns:a16="http://schemas.microsoft.com/office/drawing/2014/main" xmlns="" val="10005"/>
+                    <a16:rowId xmlns="" xmlns:a16="http://schemas.microsoft.com/office/drawing/2014/main" val="10005"/>
                   </a:ext>
                 </a:extLst>
               </a:tr>
@@ -12786,7 +12920,7 @@
                 </a:tc>
                 <a:extLst>
                   <a:ext uri="{0D108BD9-81ED-4DB2-BD59-A6C34878D82A}">
-                    <a16:rowId xmlns:a16="http://schemas.microsoft.com/office/drawing/2014/main" xmlns="" val="10006"/>
+                    <a16:rowId xmlns="" xmlns:a16="http://schemas.microsoft.com/office/drawing/2014/main" val="10006"/>
                   </a:ext>
                 </a:extLst>
               </a:tr>
@@ -12889,7 +13023,7 @@
                 </a:tc>
                 <a:extLst>
                   <a:ext uri="{0D108BD9-81ED-4DB2-BD59-A6C34878D82A}">
-                    <a16:rowId xmlns:a16="http://schemas.microsoft.com/office/drawing/2014/main" xmlns="" val="10007"/>
+                    <a16:rowId xmlns="" xmlns:a16="http://schemas.microsoft.com/office/drawing/2014/main" val="10007"/>
                   </a:ext>
                 </a:extLst>
               </a:tr>
@@ -12992,7 +13126,7 @@
                 </a:tc>
                 <a:extLst>
                   <a:ext uri="{0D108BD9-81ED-4DB2-BD59-A6C34878D82A}">
-                    <a16:rowId xmlns:a16="http://schemas.microsoft.com/office/drawing/2014/main" xmlns="" val="10008"/>
+                    <a16:rowId xmlns="" xmlns:a16="http://schemas.microsoft.com/office/drawing/2014/main" val="10008"/>
                   </a:ext>
                 </a:extLst>
               </a:tr>
@@ -13092,7 +13226,7 @@
                 </a:tc>
                 <a:extLst>
                   <a:ext uri="{0D108BD9-81ED-4DB2-BD59-A6C34878D82A}">
-                    <a16:rowId xmlns:a16="http://schemas.microsoft.com/office/drawing/2014/main" xmlns="" val="10009"/>
+                    <a16:rowId xmlns="" xmlns:a16="http://schemas.microsoft.com/office/drawing/2014/main" val="10009"/>
                   </a:ext>
                 </a:extLst>
               </a:tr>
@@ -20607,12 +20741,73 @@
             <a:pPr>
               <a:defRPr/>
             </a:pPr>
+            <a:endParaRPr lang="en-US" sz="1600" b="1" dirty="0" smtClean="0">
+              <a:solidFill>
+                <a:schemeClr val="tx2"/>
+              </a:solidFill>
+              <a:cs typeface="Courier New" panose="02070309020205020404" pitchFamily="49" charset="0"/>
+            </a:endParaRPr>
+          </a:p>
+          <a:p>
+            <a:pPr>
+              <a:defRPr/>
+            </a:pPr>
             <a:endParaRPr lang="en-US" sz="1600" b="1" dirty="0">
               <a:solidFill>
                 <a:schemeClr val="tx2"/>
               </a:solidFill>
               <a:cs typeface="Courier New" panose="02070309020205020404" pitchFamily="49" charset="0"/>
             </a:endParaRPr>
+          </a:p>
+          <a:p>
+            <a:pPr>
+              <a:defRPr/>
+            </a:pPr>
+            <a:r>
+              <a:rPr lang="en-US" sz="1600" b="1" dirty="0" smtClean="0">
+                <a:solidFill>
+                  <a:srgbClr val="FFFF00"/>
+                </a:solidFill>
+                <a:cs typeface="Courier New" panose="02070309020205020404" pitchFamily="49" charset="0"/>
+              </a:rPr>
+              <a:t>Used to create unique hashes.</a:t>
+            </a:r>
+            <a:r>
+              <a:rPr lang="en-US" sz="1600" b="1" dirty="0">
+                <a:solidFill>
+                  <a:srgbClr val="FFFF00"/>
+                </a:solidFill>
+                <a:cs typeface="Courier New" panose="02070309020205020404" pitchFamily="49" charset="0"/>
+              </a:rPr>
+              <a:t> </a:t>
+            </a:r>
+            <a:r>
+              <a:rPr lang="en-US" sz="1600" b="1" dirty="0" smtClean="0">
+                <a:solidFill>
+                  <a:srgbClr val="FFFF00"/>
+                </a:solidFill>
+                <a:cs typeface="Courier New" panose="02070309020205020404" pitchFamily="49" charset="0"/>
+              </a:rPr>
+              <a:t>Or used for selling tickets online for a popular contest to identify who was first,</a:t>
+            </a:r>
+            <a:r>
+              <a:rPr lang="en-US" sz="1600" b="1" dirty="0">
+                <a:solidFill>
+                  <a:srgbClr val="FFFF00"/>
+                </a:solidFill>
+                <a:cs typeface="Courier New" panose="02070309020205020404" pitchFamily="49" charset="0"/>
+              </a:rPr>
+              <a:t> </a:t>
+            </a:r>
+            <a:r>
+              <a:rPr lang="en-US" sz="1600" b="1" dirty="0" smtClean="0">
+                <a:solidFill>
+                  <a:srgbClr val="FFFF00"/>
+                </a:solidFill>
+                <a:cs typeface="Courier New" panose="02070309020205020404" pitchFamily="49" charset="0"/>
+              </a:rPr>
+              <a:t>second, third, etc.</a:t>
+            </a:r>
           </a:p>
         </p:txBody>
       </p:sp>

</xml_diff>